<commit_message>
added diagram of waveguide model
</commit_message>
<xml_diff>
--- a/report/figures/Figures.pptx
+++ b/report/figures/Figures.pptx
@@ -104,6 +104,11 @@
       </a:defRPr>
     </a:lvl9pPr>
   </p:defaultTextStyle>
+  <p:extLst>
+    <p:ext uri="{EFAFB233-063F-42B5-8137-9DF3F51BA10A}">
+      <p15:sldGuideLst xmlns:p15="http://schemas.microsoft.com/office/powerpoint/2012/main"/>
+    </p:ext>
+  </p:extLst>
 </p:presentation>
 </file>
 
@@ -3554,7 +3559,7 @@
         </p:nvSpPr>
         <p:spPr>
           <a:xfrm>
-            <a:off x="5226519" y="2415100"/>
+            <a:off x="4912650" y="2694133"/>
             <a:ext cx="4846320" cy="1293963"/>
           </a:xfrm>
           <a:prstGeom prst="rect">
@@ -3608,7 +3613,7 @@
         </p:nvCxnSpPr>
         <p:spPr>
           <a:xfrm>
-            <a:off x="9869170" y="2415100"/>
+            <a:off x="9607059" y="2694132"/>
             <a:ext cx="0" cy="1293963"/>
           </a:xfrm>
           <a:prstGeom prst="line">
@@ -3616,7 +3621,7 @@
           </a:prstGeom>
           <a:ln w="28575">
             <a:solidFill>
-              <a:schemeClr val="tx1"/>
+              <a:srgbClr val="0070C0"/>
             </a:solidFill>
             <a:prstDash val="dash"/>
           </a:ln>
@@ -3783,8 +3788,8 @@
           </a:p>
         </p:txBody>
       </p:sp>
-      <mc:AlternateContent xmlns:mc="http://schemas.openxmlformats.org/markup-compatibility/2006">
-        <mc:Choice xmlns:a14="http://schemas.microsoft.com/office/drawing/2010/main" Requires="a14">
+      <mc:AlternateContent xmlns:mc="http://schemas.openxmlformats.org/markup-compatibility/2006" xmlns:a14="http://schemas.microsoft.com/office/drawing/2010/main">
+        <mc:Choice Requires="a14">
           <p:sp>
             <p:nvSpPr>
               <p:cNvPr id="40" name="TextBox 39">
@@ -3815,7 +3820,11 @@
               <a:p>
                 <a:pPr algn="ctr"/>
                 <a:r>
-                  <a:rPr lang="en-US" dirty="0"/>
+                  <a:rPr lang="en-US" dirty="0">
+                    <a:latin typeface="CMU Sans Serif" panose="02000603000000000000" pitchFamily="2" charset="0"/>
+                    <a:ea typeface="CMU Sans Serif" panose="02000603000000000000" pitchFamily="2" charset="0"/>
+                    <a:cs typeface="CMU Sans Serif" panose="02000603000000000000" pitchFamily="2" charset="0"/>
+                  </a:rPr>
                   <a:t>Dielectric</a:t>
                 </a:r>
                 <a14:m>
@@ -3878,12 +3887,16 @@
                     </m:sSub>
                   </m:oMath>
                 </a14:m>
-                <a:endParaRPr lang="en-US" dirty="0"/>
+                <a:endParaRPr lang="en-US" dirty="0">
+                  <a:latin typeface="CMU Sans Serif" panose="02000603000000000000" pitchFamily="2" charset="0"/>
+                  <a:ea typeface="CMU Sans Serif" panose="02000603000000000000" pitchFamily="2" charset="0"/>
+                  <a:cs typeface="CMU Sans Serif" panose="02000603000000000000" pitchFamily="2" charset="0"/>
+                </a:endParaRPr>
               </a:p>
             </p:txBody>
           </p:sp>
         </mc:Choice>
-        <mc:Fallback>
+        <mc:Fallback xmlns="">
           <p:sp>
             <p:nvSpPr>
               <p:cNvPr id="40" name="TextBox 39">
@@ -3909,7 +3922,7 @@
               <a:blipFill>
                 <a:blip r:embed="rId2"/>
                 <a:stretch>
-                  <a:fillRect t="-5660" b="-1887"/>
+                  <a:fillRect t="-5660" r="-513"/>
                 </a:stretch>
               </a:blipFill>
             </p:spPr>
@@ -4060,8 +4073,8 @@
           </a:fontRef>
         </p:style>
       </p:cxnSp>
-      <mc:AlternateContent xmlns:mc="http://schemas.openxmlformats.org/markup-compatibility/2006">
-        <mc:Choice xmlns:a14="http://schemas.microsoft.com/office/drawing/2010/main" Requires="a14">
+      <mc:AlternateContent xmlns:mc="http://schemas.openxmlformats.org/markup-compatibility/2006" xmlns:a14="http://schemas.microsoft.com/office/drawing/2010/main">
+        <mc:Choice Requires="a14">
           <p:sp>
             <p:nvSpPr>
               <p:cNvPr id="56" name="TextBox 55">
@@ -4090,6 +4103,7 @@
               </a:bodyPr>
               <a:lstStyle/>
               <a:p>
+                <a:pPr/>
                 <a14:m>
                   <m:oMathPara xmlns:m="http://schemas.openxmlformats.org/officeDocument/2006/math">
                     <m:oMathParaPr>
@@ -4122,7 +4136,7 @@
             </p:txBody>
           </p:sp>
         </mc:Choice>
-        <mc:Fallback>
+        <mc:Fallback xmlns="">
           <p:sp>
             <p:nvSpPr>
               <p:cNvPr id="56" name="TextBox 55">
@@ -4167,8 +4181,8 @@
           </p:sp>
         </mc:Fallback>
       </mc:AlternateContent>
-      <mc:AlternateContent xmlns:mc="http://schemas.openxmlformats.org/markup-compatibility/2006">
-        <mc:Choice xmlns:a14="http://schemas.microsoft.com/office/drawing/2010/main" Requires="a14">
+      <mc:AlternateContent xmlns:mc="http://schemas.openxmlformats.org/markup-compatibility/2006" xmlns:a14="http://schemas.microsoft.com/office/drawing/2010/main">
+        <mc:Choice Requires="a14">
           <p:sp>
             <p:nvSpPr>
               <p:cNvPr id="57" name="TextBox 56">
@@ -4197,6 +4211,7 @@
               </a:bodyPr>
               <a:lstStyle/>
               <a:p>
+                <a:pPr/>
                 <a14:m>
                   <m:oMathPara xmlns:m="http://schemas.openxmlformats.org/officeDocument/2006/math">
                     <m:oMathParaPr>
@@ -4229,7 +4244,7 @@
             </p:txBody>
           </p:sp>
         </mc:Choice>
-        <mc:Fallback>
+        <mc:Fallback xmlns="">
           <p:sp>
             <p:nvSpPr>
               <p:cNvPr id="57" name="TextBox 56">
@@ -4274,8 +4289,8 @@
           </p:sp>
         </mc:Fallback>
       </mc:AlternateContent>
-      <mc:AlternateContent xmlns:mc="http://schemas.openxmlformats.org/markup-compatibility/2006">
-        <mc:Choice xmlns:a14="http://schemas.microsoft.com/office/drawing/2010/main" Requires="a14">
+      <mc:AlternateContent xmlns:mc="http://schemas.openxmlformats.org/markup-compatibility/2006" xmlns:a14="http://schemas.microsoft.com/office/drawing/2010/main">
+        <mc:Choice Requires="a14">
           <p:sp>
             <p:nvSpPr>
               <p:cNvPr id="58" name="TextBox 57">
@@ -4304,6 +4319,7 @@
               </a:bodyPr>
               <a:lstStyle/>
               <a:p>
+                <a:pPr/>
                 <a14:m>
                   <m:oMathPara xmlns:m="http://schemas.openxmlformats.org/officeDocument/2006/math">
                     <m:oMathParaPr>
@@ -4336,7 +4352,7 @@
             </p:txBody>
           </p:sp>
         </mc:Choice>
-        <mc:Fallback>
+        <mc:Fallback xmlns="">
           <p:sp>
             <p:nvSpPr>
               <p:cNvPr id="58" name="TextBox 57">
@@ -4381,8 +4397,8 @@
           </p:sp>
         </mc:Fallback>
       </mc:AlternateContent>
-      <mc:AlternateContent xmlns:mc="http://schemas.openxmlformats.org/markup-compatibility/2006">
-        <mc:Choice xmlns:a14="http://schemas.microsoft.com/office/drawing/2010/main" Requires="a14">
+      <mc:AlternateContent xmlns:mc="http://schemas.openxmlformats.org/markup-compatibility/2006" xmlns:a14="http://schemas.microsoft.com/office/drawing/2010/main">
+        <mc:Choice Requires="a14">
           <p:sp>
             <p:nvSpPr>
               <p:cNvPr id="59" name="TextBox 58">
@@ -4411,6 +4427,7 @@
               </a:bodyPr>
               <a:lstStyle/>
               <a:p>
+                <a:pPr/>
                 <a14:m>
                   <m:oMathPara xmlns:m="http://schemas.openxmlformats.org/officeDocument/2006/math">
                     <m:oMathParaPr>
@@ -4431,7 +4448,7 @@
             </p:txBody>
           </p:sp>
         </mc:Choice>
-        <mc:Fallback>
+        <mc:Fallback xmlns="">
           <p:sp>
             <p:nvSpPr>
               <p:cNvPr id="59" name="TextBox 58">
@@ -4476,8 +4493,8 @@
           </p:sp>
         </mc:Fallback>
       </mc:AlternateContent>
-      <mc:AlternateContent xmlns:mc="http://schemas.openxmlformats.org/markup-compatibility/2006">
-        <mc:Choice xmlns:a14="http://schemas.microsoft.com/office/drawing/2010/main" Requires="a14">
+      <mc:AlternateContent xmlns:mc="http://schemas.openxmlformats.org/markup-compatibility/2006" xmlns:a14="http://schemas.microsoft.com/office/drawing/2010/main">
+        <mc:Choice Requires="a14">
           <p:sp>
             <p:nvSpPr>
               <p:cNvPr id="60" name="TextBox 59">
@@ -4506,6 +4523,7 @@
               </a:bodyPr>
               <a:lstStyle/>
               <a:p>
+                <a:pPr/>
                 <a14:m>
                   <m:oMathPara xmlns:m="http://schemas.openxmlformats.org/officeDocument/2006/math">
                     <m:oMathParaPr>
@@ -4526,7 +4544,7 @@
             </p:txBody>
           </p:sp>
         </mc:Choice>
-        <mc:Fallback>
+        <mc:Fallback xmlns="">
           <p:sp>
             <p:nvSpPr>
               <p:cNvPr id="60" name="TextBox 59">
@@ -4571,8 +4589,8 @@
           </p:sp>
         </mc:Fallback>
       </mc:AlternateContent>
-      <mc:AlternateContent xmlns:mc="http://schemas.openxmlformats.org/markup-compatibility/2006">
-        <mc:Choice xmlns:a14="http://schemas.microsoft.com/office/drawing/2010/main" Requires="a14">
+      <mc:AlternateContent xmlns:mc="http://schemas.openxmlformats.org/markup-compatibility/2006" xmlns:a14="http://schemas.microsoft.com/office/drawing/2010/main">
+        <mc:Choice Requires="a14">
           <p:sp>
             <p:nvSpPr>
               <p:cNvPr id="61" name="TextBox 60">
@@ -4601,6 +4619,7 @@
               </a:bodyPr>
               <a:lstStyle/>
               <a:p>
+                <a:pPr/>
                 <a14:m>
                   <m:oMathPara xmlns:m="http://schemas.openxmlformats.org/officeDocument/2006/math">
                     <m:oMathParaPr>
@@ -4621,7 +4640,7 @@
             </p:txBody>
           </p:sp>
         </mc:Choice>
-        <mc:Fallback>
+        <mc:Fallback xmlns="">
           <p:sp>
             <p:nvSpPr>
               <p:cNvPr id="61" name="TextBox 60">
@@ -4696,7 +4715,11 @@
           <a:p>
             <a:pPr algn="ctr"/>
             <a:r>
-              <a:rPr lang="en-US" dirty="0"/>
+              <a:rPr lang="en-US" dirty="0">
+                <a:latin typeface="CMU Sans Serif" panose="02000603000000000000" pitchFamily="2" charset="0"/>
+                <a:ea typeface="CMU Sans Serif" panose="02000603000000000000" pitchFamily="2" charset="0"/>
+                <a:cs typeface="CMU Sans Serif" panose="02000603000000000000" pitchFamily="2" charset="0"/>
+              </a:rPr>
               <a:t>PEC</a:t>
             </a:r>
           </a:p>
@@ -4716,8 +4739,8 @@
         </p:nvSpPr>
         <p:spPr>
           <a:xfrm>
-            <a:off x="3153479" y="3275706"/>
-            <a:ext cx="539388" cy="369332"/>
+            <a:off x="3041880" y="3275706"/>
+            <a:ext cx="650987" cy="369332"/>
           </a:xfrm>
           <a:prstGeom prst="rect">
             <a:avLst/>
@@ -4731,7 +4754,11 @@
           <a:lstStyle/>
           <a:p>
             <a:r>
-              <a:rPr lang="en-US" dirty="0"/>
+              <a:rPr lang="en-US" dirty="0">
+                <a:latin typeface="CMU Sans Serif" panose="02000603000000000000" pitchFamily="2" charset="0"/>
+                <a:ea typeface="CMU Sans Serif" panose="02000603000000000000" pitchFamily="2" charset="0"/>
+                <a:cs typeface="CMU Sans Serif" panose="02000603000000000000" pitchFamily="2" charset="0"/>
+              </a:rPr>
               <a:t>PEC</a:t>
             </a:r>
           </a:p>
@@ -4739,10 +4766,10 @@
       </p:sp>
       <p:sp>
         <p:nvSpPr>
-          <p:cNvPr id="66" name="Left Brace 65">
-            <a:extLst>
-              <a:ext uri="{FF2B5EF4-FFF2-40B4-BE49-F238E27FC236}">
-                <a16:creationId xmlns:a16="http://schemas.microsoft.com/office/drawing/2014/main" id="{4D243055-1C16-0306-B7E1-70950DC70646}"/>
+          <p:cNvPr id="14" name="Rectangle 13">
+            <a:extLst>
+              <a:ext uri="{FF2B5EF4-FFF2-40B4-BE49-F238E27FC236}">
+                <a16:creationId xmlns:a16="http://schemas.microsoft.com/office/drawing/2014/main" id="{A0C16CF6-B897-A66B-831C-6E0B79EA71E9}"/>
               </a:ext>
             </a:extLst>
           </p:cNvPr>
@@ -4750,11 +4777,1100 @@
           <p:nvPr/>
         </p:nvSpPr>
         <p:spPr>
-          <a:xfrm rot="13127382">
-            <a:off x="6167009" y="3724719"/>
-            <a:ext cx="220980" cy="1673212"/>
+          <a:xfrm>
+            <a:off x="4912650" y="2624880"/>
+            <a:ext cx="4846314" cy="69252"/>
           </a:xfrm>
-          <a:prstGeom prst="leftBrace">
+          <a:prstGeom prst="rect">
+            <a:avLst/>
+          </a:prstGeom>
+          <a:solidFill>
+            <a:schemeClr val="bg2"/>
+          </a:solidFill>
+          <a:ln w="28575">
+            <a:solidFill>
+              <a:schemeClr val="tx1"/>
+            </a:solidFill>
+          </a:ln>
+        </p:spPr>
+        <p:style>
+          <a:lnRef idx="2">
+            <a:schemeClr val="accent1">
+              <a:shade val="15000"/>
+            </a:schemeClr>
+          </a:lnRef>
+          <a:fillRef idx="1">
+            <a:schemeClr val="accent1"/>
+          </a:fillRef>
+          <a:effectRef idx="0">
+            <a:schemeClr val="accent1"/>
+          </a:effectRef>
+          <a:fontRef idx="minor">
+            <a:schemeClr val="lt1"/>
+          </a:fontRef>
+        </p:style>
+        <p:txBody>
+          <a:bodyPr rtlCol="0" anchor="ctr"/>
+          <a:lstStyle/>
+          <a:p>
+            <a:pPr algn="ctr"/>
+            <a:endParaRPr lang="en-US"/>
+          </a:p>
+        </p:txBody>
+      </p:sp>
+      <p:sp>
+        <p:nvSpPr>
+          <p:cNvPr id="15" name="Rectangle 14">
+            <a:extLst>
+              <a:ext uri="{FF2B5EF4-FFF2-40B4-BE49-F238E27FC236}">
+                <a16:creationId xmlns:a16="http://schemas.microsoft.com/office/drawing/2014/main" id="{27FE5C5A-D266-C6ED-B53F-8A56954C8514}"/>
+              </a:ext>
+            </a:extLst>
+          </p:cNvPr>
+          <p:cNvSpPr/>
+          <p:nvPr/>
+        </p:nvSpPr>
+        <p:spPr>
+          <a:xfrm>
+            <a:off x="4912650" y="3988095"/>
+            <a:ext cx="4846314" cy="69252"/>
+          </a:xfrm>
+          <a:prstGeom prst="rect">
+            <a:avLst/>
+          </a:prstGeom>
+          <a:solidFill>
+            <a:schemeClr val="bg2"/>
+          </a:solidFill>
+          <a:ln w="28575"/>
+        </p:spPr>
+        <p:style>
+          <a:lnRef idx="2">
+            <a:schemeClr val="accent1">
+              <a:shade val="15000"/>
+            </a:schemeClr>
+          </a:lnRef>
+          <a:fillRef idx="1">
+            <a:schemeClr val="accent1"/>
+          </a:fillRef>
+          <a:effectRef idx="0">
+            <a:schemeClr val="accent1"/>
+          </a:effectRef>
+          <a:fontRef idx="minor">
+            <a:schemeClr val="lt1"/>
+          </a:fontRef>
+        </p:style>
+        <p:txBody>
+          <a:bodyPr rtlCol="0" anchor="ctr"/>
+          <a:lstStyle/>
+          <a:p>
+            <a:pPr algn="ctr"/>
+            <a:endParaRPr lang="en-US"/>
+          </a:p>
+        </p:txBody>
+      </p:sp>
+      <mc:AlternateContent xmlns:mc="http://schemas.openxmlformats.org/markup-compatibility/2006" xmlns:a14="http://schemas.microsoft.com/office/drawing/2010/main">
+        <mc:Choice Requires="a14">
+          <p:sp>
+            <p:nvSpPr>
+              <p:cNvPr id="23" name="TextBox 22">
+                <a:extLst>
+                  <a:ext uri="{FF2B5EF4-FFF2-40B4-BE49-F238E27FC236}">
+                    <a16:creationId xmlns:a16="http://schemas.microsoft.com/office/drawing/2014/main" id="{9AC0D762-4B53-ACC5-9E16-CE3641A2253F}"/>
+                  </a:ext>
+                </a:extLst>
+              </p:cNvPr>
+              <p:cNvSpPr txBox="1"/>
+              <p:nvPr/>
+            </p:nvSpPr>
+            <p:spPr>
+              <a:xfrm>
+                <a:off x="4891166" y="3027450"/>
+                <a:ext cx="306516" cy="369332"/>
+              </a:xfrm>
+              <a:prstGeom prst="rect">
+                <a:avLst/>
+              </a:prstGeom>
+              <a:noFill/>
+            </p:spPr>
+            <p:txBody>
+              <a:bodyPr wrap="square" rtlCol="0">
+                <a:spAutoFit/>
+              </a:bodyPr>
+              <a:lstStyle/>
+              <a:p>
+                <a:pPr/>
+                <a14:m>
+                  <m:oMathPara xmlns:m="http://schemas.openxmlformats.org/officeDocument/2006/math">
+                    <m:oMathParaPr>
+                      <m:jc m:val="centerGroup"/>
+                    </m:oMathParaPr>
+                    <m:oMath xmlns:m="http://schemas.openxmlformats.org/officeDocument/2006/math">
+                      <m:acc>
+                        <m:accPr>
+                          <m:chr m:val="̂"/>
+                          <m:ctrlPr>
+                            <a:rPr lang="en-US" b="0" i="1" smtClean="0">
+                              <a:latin typeface="Cambria Math" panose="02040503050406030204" pitchFamily="18" charset="0"/>
+                            </a:rPr>
+                          </m:ctrlPr>
+                        </m:accPr>
+                        <m:e>
+                          <m:r>
+                            <a:rPr lang="en-US" b="0" i="1" smtClean="0">
+                              <a:latin typeface="Cambria Math" panose="02040503050406030204" pitchFamily="18" charset="0"/>
+                            </a:rPr>
+                            <m:t>𝑥</m:t>
+                          </m:r>
+                        </m:e>
+                      </m:acc>
+                    </m:oMath>
+                  </m:oMathPara>
+                </a14:m>
+                <a:endParaRPr lang="en-US" dirty="0"/>
+              </a:p>
+            </p:txBody>
+          </p:sp>
+        </mc:Choice>
+        <mc:Fallback xmlns="">
+          <p:sp>
+            <p:nvSpPr>
+              <p:cNvPr id="23" name="TextBox 22">
+                <a:extLst>
+                  <a:ext uri="{FF2B5EF4-FFF2-40B4-BE49-F238E27FC236}">
+                    <a16:creationId xmlns:a16="http://schemas.microsoft.com/office/drawing/2014/main" id="{9AC0D762-4B53-ACC5-9E16-CE3641A2253F}"/>
+                  </a:ext>
+                </a:extLst>
+              </p:cNvPr>
+              <p:cNvSpPr txBox="1">
+                <a:spLocks noRot="1" noChangeAspect="1" noMove="1" noResize="1" noEditPoints="1" noAdjustHandles="1" noChangeArrowheads="1" noChangeShapeType="1" noTextEdit="1"/>
+              </p:cNvSpPr>
+              <p:nvPr/>
+            </p:nvSpPr>
+            <p:spPr>
+              <a:xfrm>
+                <a:off x="4891166" y="3027450"/>
+                <a:ext cx="306516" cy="369332"/>
+              </a:xfrm>
+              <a:prstGeom prst="rect">
+                <a:avLst/>
+              </a:prstGeom>
+              <a:blipFill>
+                <a:blip r:embed="rId9"/>
+                <a:stretch>
+                  <a:fillRect t="-6667" r="-7843"/>
+                </a:stretch>
+              </a:blipFill>
+            </p:spPr>
+            <p:txBody>
+              <a:bodyPr/>
+              <a:lstStyle/>
+              <a:p>
+                <a:r>
+                  <a:rPr lang="en-US">
+                    <a:noFill/>
+                  </a:rPr>
+                  <a:t> </a:t>
+                </a:r>
+              </a:p>
+            </p:txBody>
+          </p:sp>
+        </mc:Fallback>
+      </mc:AlternateContent>
+      <p:sp>
+        <p:nvSpPr>
+          <p:cNvPr id="26" name="Rectangle 25">
+            <a:extLst>
+              <a:ext uri="{FF2B5EF4-FFF2-40B4-BE49-F238E27FC236}">
+                <a16:creationId xmlns:a16="http://schemas.microsoft.com/office/drawing/2014/main" id="{92083DF8-7629-EBF1-1A77-064EF94BE9A5}"/>
+              </a:ext>
+            </a:extLst>
+          </p:cNvPr>
+          <p:cNvSpPr/>
+          <p:nvPr/>
+        </p:nvSpPr>
+        <p:spPr>
+          <a:xfrm rot="16200000">
+            <a:off x="4187595" y="3303748"/>
+            <a:ext cx="1432468" cy="74729"/>
+          </a:xfrm>
+          <a:prstGeom prst="rect">
+            <a:avLst/>
+          </a:prstGeom>
+          <a:solidFill>
+            <a:srgbClr val="FFC000"/>
+          </a:solidFill>
+          <a:ln w="28575">
+            <a:solidFill>
+              <a:schemeClr val="tx1"/>
+            </a:solidFill>
+          </a:ln>
+        </p:spPr>
+        <p:style>
+          <a:lnRef idx="2">
+            <a:schemeClr val="accent1">
+              <a:shade val="15000"/>
+            </a:schemeClr>
+          </a:lnRef>
+          <a:fillRef idx="1">
+            <a:schemeClr val="accent1"/>
+          </a:fillRef>
+          <a:effectRef idx="0">
+            <a:schemeClr val="accent1"/>
+          </a:effectRef>
+          <a:fontRef idx="minor">
+            <a:schemeClr val="lt1"/>
+          </a:fontRef>
+        </p:style>
+        <p:txBody>
+          <a:bodyPr rtlCol="0" anchor="ctr"/>
+          <a:lstStyle/>
+          <a:p>
+            <a:pPr algn="ctr"/>
+            <a:endParaRPr lang="en-US"/>
+          </a:p>
+        </p:txBody>
+      </p:sp>
+      <p:sp>
+        <p:nvSpPr>
+          <p:cNvPr id="27" name="TextBox 26">
+            <a:extLst>
+              <a:ext uri="{FF2B5EF4-FFF2-40B4-BE49-F238E27FC236}">
+                <a16:creationId xmlns:a16="http://schemas.microsoft.com/office/drawing/2014/main" id="{EFDAE7BB-3141-7066-FE4E-D179E18FD5C3}"/>
+              </a:ext>
+            </a:extLst>
+          </p:cNvPr>
+          <p:cNvSpPr txBox="1"/>
+          <p:nvPr/>
+        </p:nvSpPr>
+        <p:spPr>
+          <a:xfrm>
+            <a:off x="4527570" y="4070966"/>
+            <a:ext cx="752518" cy="646331"/>
+          </a:xfrm>
+          <a:prstGeom prst="rect">
+            <a:avLst/>
+          </a:prstGeom>
+          <a:noFill/>
+        </p:spPr>
+        <p:txBody>
+          <a:bodyPr wrap="square" rtlCol="0">
+            <a:spAutoFit/>
+          </a:bodyPr>
+          <a:lstStyle/>
+          <a:p>
+            <a:pPr algn="ctr"/>
+            <a:r>
+              <a:rPr lang="en-US" dirty="0">
+                <a:latin typeface="CMU Sans Serif" panose="02000603000000000000" pitchFamily="2" charset="0"/>
+                <a:ea typeface="CMU Sans Serif" panose="02000603000000000000" pitchFamily="2" charset="0"/>
+                <a:cs typeface="CMU Sans Serif" panose="02000603000000000000" pitchFamily="2" charset="0"/>
+              </a:rPr>
+              <a:t>Mur ABC</a:t>
+            </a:r>
+          </a:p>
+        </p:txBody>
+      </p:sp>
+      <p:sp>
+        <p:nvSpPr>
+          <p:cNvPr id="29" name="TextBox 28">
+            <a:extLst>
+              <a:ext uri="{FF2B5EF4-FFF2-40B4-BE49-F238E27FC236}">
+                <a16:creationId xmlns:a16="http://schemas.microsoft.com/office/drawing/2014/main" id="{197AB42E-AAB8-2854-54CE-B5A50D06AB1B}"/>
+              </a:ext>
+            </a:extLst>
+          </p:cNvPr>
+          <p:cNvSpPr txBox="1"/>
+          <p:nvPr/>
+        </p:nvSpPr>
+        <p:spPr>
+          <a:xfrm>
+            <a:off x="8816486" y="4076632"/>
+            <a:ext cx="1581146" cy="646331"/>
+          </a:xfrm>
+          <a:prstGeom prst="rect">
+            <a:avLst/>
+          </a:prstGeom>
+          <a:noFill/>
+        </p:spPr>
+        <p:txBody>
+          <a:bodyPr wrap="square" rtlCol="0">
+            <a:spAutoFit/>
+          </a:bodyPr>
+          <a:lstStyle/>
+          <a:p>
+            <a:pPr algn="ctr"/>
+            <a:r>
+              <a:rPr lang="en-US" dirty="0">
+                <a:latin typeface="CMU Sans Serif" panose="02000603000000000000" pitchFamily="2" charset="0"/>
+                <a:ea typeface="CMU Sans Serif" panose="02000603000000000000" pitchFamily="2" charset="0"/>
+                <a:cs typeface="CMU Sans Serif" panose="02000603000000000000" pitchFamily="2" charset="0"/>
+              </a:rPr>
+              <a:t>TF/SF</a:t>
+            </a:r>
+          </a:p>
+          <a:p>
+            <a:pPr algn="ctr"/>
+            <a:r>
+              <a:rPr lang="en-US" dirty="0">
+                <a:latin typeface="CMU Sans Serif" panose="02000603000000000000" pitchFamily="2" charset="0"/>
+                <a:ea typeface="CMU Sans Serif" panose="02000603000000000000" pitchFamily="2" charset="0"/>
+                <a:cs typeface="CMU Sans Serif" panose="02000603000000000000" pitchFamily="2" charset="0"/>
+              </a:rPr>
+              <a:t>1-Way Source</a:t>
+            </a:r>
+          </a:p>
+        </p:txBody>
+      </p:sp>
+      <mc:AlternateContent xmlns:mc="http://schemas.openxmlformats.org/markup-compatibility/2006" xmlns:a14="http://schemas.microsoft.com/office/drawing/2010/main">
+        <mc:Choice Requires="a14">
+          <p:sp>
+            <p:nvSpPr>
+              <p:cNvPr id="31" name="TextBox 30">
+                <a:extLst>
+                  <a:ext uri="{FF2B5EF4-FFF2-40B4-BE49-F238E27FC236}">
+                    <a16:creationId xmlns:a16="http://schemas.microsoft.com/office/drawing/2014/main" id="{29E5D472-D594-429B-B61C-A13B8A589C7E}"/>
+                  </a:ext>
+                </a:extLst>
+              </p:cNvPr>
+              <p:cNvSpPr txBox="1"/>
+              <p:nvPr/>
+            </p:nvSpPr>
+            <p:spPr>
+              <a:xfrm>
+                <a:off x="6086443" y="3104866"/>
+                <a:ext cx="1130128" cy="646331"/>
+              </a:xfrm>
+              <a:prstGeom prst="rect">
+                <a:avLst/>
+              </a:prstGeom>
+              <a:noFill/>
+            </p:spPr>
+            <p:txBody>
+              <a:bodyPr wrap="square">
+                <a:spAutoFit/>
+              </a:bodyPr>
+              <a:lstStyle/>
+              <a:p>
+                <a:pPr algn="ctr"/>
+                <a:r>
+                  <a:rPr lang="en-US" dirty="0">
+                    <a:latin typeface="CMU Sans Serif" panose="02000603000000000000" pitchFamily="2" charset="0"/>
+                    <a:ea typeface="CMU Sans Serif" panose="02000603000000000000" pitchFamily="2" charset="0"/>
+                    <a:cs typeface="CMU Sans Serif" panose="02000603000000000000" pitchFamily="2" charset="0"/>
+                  </a:rPr>
+                  <a:t>Dielectric</a:t>
+                </a:r>
+                <a14:m>
+                  <m:oMath xmlns:m="http://schemas.openxmlformats.org/officeDocument/2006/math">
+                    <m:sSub>
+                      <m:sSubPr>
+                        <m:ctrlPr>
+                          <a:rPr lang="en-US" b="0" i="1" smtClean="0">
+                            <a:latin typeface="Cambria Math" panose="02040503050406030204" pitchFamily="18" charset="0"/>
+                          </a:rPr>
+                        </m:ctrlPr>
+                      </m:sSubPr>
+                      <m:e>
+                        <m:r>
+                          <a:rPr lang="en-US" b="0" i="1" smtClean="0">
+                            <a:latin typeface="Cambria Math" panose="02040503050406030204" pitchFamily="18" charset="0"/>
+                          </a:rPr>
+                          <m:t>𝜖</m:t>
+                        </m:r>
+                      </m:e>
+                      <m:sub>
+                        <m:r>
+                          <a:rPr lang="en-US" b="0" i="1" smtClean="0">
+                            <a:latin typeface="Cambria Math" panose="02040503050406030204" pitchFamily="18" charset="0"/>
+                          </a:rPr>
+                          <m:t>1</m:t>
+                        </m:r>
+                      </m:sub>
+                    </m:sSub>
+                    <m:r>
+                      <a:rPr lang="en-US" b="0" i="1" smtClean="0">
+                        <a:latin typeface="Cambria Math" panose="02040503050406030204" pitchFamily="18" charset="0"/>
+                      </a:rPr>
+                      <m:t>, </m:t>
+                    </m:r>
+                    <m:sSub>
+                      <m:sSubPr>
+                        <m:ctrlPr>
+                          <a:rPr lang="en-US" b="0" i="1" smtClean="0">
+                            <a:latin typeface="Cambria Math" panose="02040503050406030204" pitchFamily="18" charset="0"/>
+                          </a:rPr>
+                        </m:ctrlPr>
+                      </m:sSubPr>
+                      <m:e>
+                        <m:r>
+                          <a:rPr lang="en-US" b="0" i="1" smtClean="0">
+                            <a:latin typeface="Cambria Math" panose="02040503050406030204" pitchFamily="18" charset="0"/>
+                          </a:rPr>
+                          <m:t>𝜇</m:t>
+                        </m:r>
+                      </m:e>
+                      <m:sub>
+                        <m:r>
+                          <a:rPr lang="en-US" b="0" i="1" smtClean="0">
+                            <a:latin typeface="Cambria Math" panose="02040503050406030204" pitchFamily="18" charset="0"/>
+                          </a:rPr>
+                          <m:t>1</m:t>
+                        </m:r>
+                      </m:sub>
+                    </m:sSub>
+                  </m:oMath>
+                </a14:m>
+                <a:endParaRPr lang="en-US" dirty="0">
+                  <a:latin typeface="CMU Sans Serif" panose="02000603000000000000" pitchFamily="2" charset="0"/>
+                  <a:ea typeface="CMU Sans Serif" panose="02000603000000000000" pitchFamily="2" charset="0"/>
+                  <a:cs typeface="CMU Sans Serif" panose="02000603000000000000" pitchFamily="2" charset="0"/>
+                </a:endParaRPr>
+              </a:p>
+            </p:txBody>
+          </p:sp>
+        </mc:Choice>
+        <mc:Fallback xmlns="">
+          <p:sp>
+            <p:nvSpPr>
+              <p:cNvPr id="31" name="TextBox 30">
+                <a:extLst>
+                  <a:ext uri="{FF2B5EF4-FFF2-40B4-BE49-F238E27FC236}">
+                    <a16:creationId xmlns:a16="http://schemas.microsoft.com/office/drawing/2014/main" id="{29E5D472-D594-429B-B61C-A13B8A589C7E}"/>
+                  </a:ext>
+                </a:extLst>
+              </p:cNvPr>
+              <p:cNvSpPr txBox="1">
+                <a:spLocks noRot="1" noChangeAspect="1" noMove="1" noResize="1" noEditPoints="1" noAdjustHandles="1" noChangeArrowheads="1" noChangeShapeType="1" noTextEdit="1"/>
+              </p:cNvSpPr>
+              <p:nvPr/>
+            </p:nvSpPr>
+            <p:spPr>
+              <a:xfrm>
+                <a:off x="6086443" y="3104866"/>
+                <a:ext cx="1130128" cy="646331"/>
+              </a:xfrm>
+              <a:prstGeom prst="rect">
+                <a:avLst/>
+              </a:prstGeom>
+              <a:blipFill>
+                <a:blip r:embed="rId10"/>
+                <a:stretch>
+                  <a:fillRect l="-2688" t="-4717" r="-2688"/>
+                </a:stretch>
+              </a:blipFill>
+            </p:spPr>
+            <p:txBody>
+              <a:bodyPr/>
+              <a:lstStyle/>
+              <a:p>
+                <a:r>
+                  <a:rPr lang="en-US">
+                    <a:noFill/>
+                  </a:rPr>
+                  <a:t> </a:t>
+                </a:r>
+              </a:p>
+            </p:txBody>
+          </p:sp>
+        </mc:Fallback>
+      </mc:AlternateContent>
+      <p:cxnSp>
+        <p:nvCxnSpPr>
+          <p:cNvPr id="7" name="Straight Arrow Connector 6">
+            <a:extLst>
+              <a:ext uri="{FF2B5EF4-FFF2-40B4-BE49-F238E27FC236}">
+                <a16:creationId xmlns:a16="http://schemas.microsoft.com/office/drawing/2014/main" id="{128C908A-CBB3-E1DE-317E-EC865FE419E8}"/>
+              </a:ext>
+            </a:extLst>
+          </p:cNvPr>
+          <p:cNvCxnSpPr>
+            <a:cxnSpLocks/>
+          </p:cNvCxnSpPr>
+          <p:nvPr/>
+        </p:nvCxnSpPr>
+        <p:spPr>
+          <a:xfrm>
+            <a:off x="4958373" y="2694132"/>
+            <a:ext cx="0" cy="400652"/>
+          </a:xfrm>
+          <a:prstGeom prst="straightConnector1">
+            <a:avLst/>
+          </a:prstGeom>
+          <a:ln w="28575">
+            <a:solidFill>
+              <a:srgbClr val="C00000"/>
+            </a:solidFill>
+            <a:tailEnd type="triangle"/>
+          </a:ln>
+        </p:spPr>
+        <p:style>
+          <a:lnRef idx="1">
+            <a:schemeClr val="accent1"/>
+          </a:lnRef>
+          <a:fillRef idx="0">
+            <a:schemeClr val="accent1"/>
+          </a:fillRef>
+          <a:effectRef idx="0">
+            <a:schemeClr val="accent1"/>
+          </a:effectRef>
+          <a:fontRef idx="minor">
+            <a:schemeClr val="tx1"/>
+          </a:fontRef>
+        </p:style>
+      </p:cxnSp>
+      <p:cxnSp>
+        <p:nvCxnSpPr>
+          <p:cNvPr id="4" name="Straight Arrow Connector 3">
+            <a:extLst>
+              <a:ext uri="{FF2B5EF4-FFF2-40B4-BE49-F238E27FC236}">
+                <a16:creationId xmlns:a16="http://schemas.microsoft.com/office/drawing/2014/main" id="{A16E8ABE-2065-4BB4-D7A8-64B865DE5001}"/>
+              </a:ext>
+            </a:extLst>
+          </p:cNvPr>
+          <p:cNvCxnSpPr>
+            <a:cxnSpLocks/>
+          </p:cNvCxnSpPr>
+          <p:nvPr/>
+        </p:nvCxnSpPr>
+        <p:spPr>
+          <a:xfrm>
+            <a:off x="4958373" y="2694132"/>
+            <a:ext cx="414962" cy="0"/>
+          </a:xfrm>
+          <a:prstGeom prst="straightConnector1">
+            <a:avLst/>
+          </a:prstGeom>
+          <a:ln w="28575">
+            <a:solidFill>
+              <a:srgbClr val="C00000"/>
+            </a:solidFill>
+            <a:tailEnd type="triangle"/>
+          </a:ln>
+        </p:spPr>
+        <p:style>
+          <a:lnRef idx="1">
+            <a:schemeClr val="accent1"/>
+          </a:lnRef>
+          <a:fillRef idx="0">
+            <a:schemeClr val="accent1"/>
+          </a:fillRef>
+          <a:effectRef idx="0">
+            <a:schemeClr val="accent1"/>
+          </a:effectRef>
+          <a:fontRef idx="minor">
+            <a:schemeClr val="tx1"/>
+          </a:fontRef>
+        </p:style>
+      </p:cxnSp>
+      <p:sp>
+        <p:nvSpPr>
+          <p:cNvPr id="17" name="Oval 16">
+            <a:extLst>
+              <a:ext uri="{FF2B5EF4-FFF2-40B4-BE49-F238E27FC236}">
+                <a16:creationId xmlns:a16="http://schemas.microsoft.com/office/drawing/2014/main" id="{63D62BAA-2B67-A939-A4C5-0C9F94D4EED4}"/>
+              </a:ext>
+            </a:extLst>
+          </p:cNvPr>
+          <p:cNvSpPr/>
+          <p:nvPr/>
+        </p:nvSpPr>
+        <p:spPr>
+          <a:xfrm>
+            <a:off x="4935514" y="2666961"/>
+            <a:ext cx="45719" cy="45719"/>
+          </a:xfrm>
+          <a:prstGeom prst="ellipse">
+            <a:avLst/>
+          </a:prstGeom>
+          <a:solidFill>
+            <a:srgbClr val="C00000"/>
+          </a:solidFill>
+          <a:ln w="28575"/>
+        </p:spPr>
+        <p:style>
+          <a:lnRef idx="2">
+            <a:schemeClr val="accent1">
+              <a:shade val="15000"/>
+            </a:schemeClr>
+          </a:lnRef>
+          <a:fillRef idx="1">
+            <a:schemeClr val="accent1"/>
+          </a:fillRef>
+          <a:effectRef idx="0">
+            <a:schemeClr val="accent1"/>
+          </a:effectRef>
+          <a:fontRef idx="minor">
+            <a:schemeClr val="lt1"/>
+          </a:fontRef>
+        </p:style>
+        <p:txBody>
+          <a:bodyPr rtlCol="0" anchor="ctr"/>
+          <a:lstStyle/>
+          <a:p>
+            <a:pPr algn="ctr"/>
+            <a:endParaRPr lang="en-US"/>
+          </a:p>
+        </p:txBody>
+      </p:sp>
+      <mc:AlternateContent xmlns:mc="http://schemas.openxmlformats.org/markup-compatibility/2006" xmlns:a14="http://schemas.microsoft.com/office/drawing/2010/main">
+        <mc:Choice Requires="a14">
+          <p:sp>
+            <p:nvSpPr>
+              <p:cNvPr id="21" name="TextBox 20">
+                <a:extLst>
+                  <a:ext uri="{FF2B5EF4-FFF2-40B4-BE49-F238E27FC236}">
+                    <a16:creationId xmlns:a16="http://schemas.microsoft.com/office/drawing/2014/main" id="{E9998498-0836-4958-4F45-9E1AF4324568}"/>
+                  </a:ext>
+                </a:extLst>
+              </p:cNvPr>
+              <p:cNvSpPr txBox="1"/>
+              <p:nvPr/>
+            </p:nvSpPr>
+            <p:spPr>
+              <a:xfrm>
+                <a:off x="5296029" y="2680513"/>
+                <a:ext cx="306516" cy="369332"/>
+              </a:xfrm>
+              <a:prstGeom prst="rect">
+                <a:avLst/>
+              </a:prstGeom>
+              <a:noFill/>
+            </p:spPr>
+            <p:txBody>
+              <a:bodyPr wrap="square" rtlCol="0">
+                <a:spAutoFit/>
+              </a:bodyPr>
+              <a:lstStyle/>
+              <a:p>
+                <a:pPr/>
+                <a14:m>
+                  <m:oMathPara xmlns:m="http://schemas.openxmlformats.org/officeDocument/2006/math">
+                    <m:oMathParaPr>
+                      <m:jc m:val="centerGroup"/>
+                    </m:oMathParaPr>
+                    <m:oMath xmlns:m="http://schemas.openxmlformats.org/officeDocument/2006/math">
+                      <m:acc>
+                        <m:accPr>
+                          <m:chr m:val="̂"/>
+                          <m:ctrlPr>
+                            <a:rPr lang="en-US" b="0" i="1" smtClean="0">
+                              <a:latin typeface="Cambria Math" panose="02040503050406030204" pitchFamily="18" charset="0"/>
+                            </a:rPr>
+                          </m:ctrlPr>
+                        </m:accPr>
+                        <m:e>
+                          <m:r>
+                            <a:rPr lang="en-US" b="0" i="1" smtClean="0">
+                              <a:latin typeface="Cambria Math" panose="02040503050406030204" pitchFamily="18" charset="0"/>
+                            </a:rPr>
+                            <m:t>𝑧</m:t>
+                          </m:r>
+                        </m:e>
+                      </m:acc>
+                    </m:oMath>
+                  </m:oMathPara>
+                </a14:m>
+                <a:endParaRPr lang="en-US" dirty="0"/>
+              </a:p>
+            </p:txBody>
+          </p:sp>
+        </mc:Choice>
+        <mc:Fallback xmlns="">
+          <p:sp>
+            <p:nvSpPr>
+              <p:cNvPr id="21" name="TextBox 20">
+                <a:extLst>
+                  <a:ext uri="{FF2B5EF4-FFF2-40B4-BE49-F238E27FC236}">
+                    <a16:creationId xmlns:a16="http://schemas.microsoft.com/office/drawing/2014/main" id="{E9998498-0836-4958-4F45-9E1AF4324568}"/>
+                  </a:ext>
+                </a:extLst>
+              </p:cNvPr>
+              <p:cNvSpPr txBox="1">
+                <a:spLocks noRot="1" noChangeAspect="1" noMove="1" noResize="1" noEditPoints="1" noAdjustHandles="1" noChangeArrowheads="1" noChangeShapeType="1" noTextEdit="1"/>
+              </p:cNvSpPr>
+              <p:nvPr/>
+            </p:nvSpPr>
+            <p:spPr>
+              <a:xfrm>
+                <a:off x="5296029" y="2680513"/>
+                <a:ext cx="306516" cy="369332"/>
+              </a:xfrm>
+              <a:prstGeom prst="rect">
+                <a:avLst/>
+              </a:prstGeom>
+              <a:blipFill>
+                <a:blip r:embed="rId11"/>
+                <a:stretch>
+                  <a:fillRect t="-6667" r="-34000"/>
+                </a:stretch>
+              </a:blipFill>
+            </p:spPr>
+            <p:txBody>
+              <a:bodyPr/>
+              <a:lstStyle/>
+              <a:p>
+                <a:r>
+                  <a:rPr lang="en-US">
+                    <a:noFill/>
+                  </a:rPr>
+                  <a:t> </a:t>
+                </a:r>
+              </a:p>
+            </p:txBody>
+          </p:sp>
+        </mc:Fallback>
+      </mc:AlternateContent>
+      <mc:AlternateContent xmlns:mc="http://schemas.openxmlformats.org/markup-compatibility/2006" xmlns:a14="http://schemas.microsoft.com/office/drawing/2010/main">
+        <mc:Choice Requires="a14">
+          <p:sp>
+            <p:nvSpPr>
+              <p:cNvPr id="25" name="TextBox 24">
+                <a:extLst>
+                  <a:ext uri="{FF2B5EF4-FFF2-40B4-BE49-F238E27FC236}">
+                    <a16:creationId xmlns:a16="http://schemas.microsoft.com/office/drawing/2014/main" id="{38D910C3-2068-2E7C-A940-D80A1361845D}"/>
+                  </a:ext>
+                </a:extLst>
+              </p:cNvPr>
+              <p:cNvSpPr txBox="1"/>
+              <p:nvPr/>
+            </p:nvSpPr>
+            <p:spPr>
+              <a:xfrm>
+                <a:off x="4603592" y="2351867"/>
+                <a:ext cx="306516" cy="369332"/>
+              </a:xfrm>
+              <a:prstGeom prst="rect">
+                <a:avLst/>
+              </a:prstGeom>
+              <a:noFill/>
+            </p:spPr>
+            <p:txBody>
+              <a:bodyPr wrap="square" rtlCol="0">
+                <a:spAutoFit/>
+              </a:bodyPr>
+              <a:lstStyle/>
+              <a:p>
+                <a:pPr/>
+                <a14:m>
+                  <m:oMathPara xmlns:m="http://schemas.openxmlformats.org/officeDocument/2006/math">
+                    <m:oMathParaPr>
+                      <m:jc m:val="centerGroup"/>
+                    </m:oMathParaPr>
+                    <m:oMath xmlns:m="http://schemas.openxmlformats.org/officeDocument/2006/math">
+                      <m:acc>
+                        <m:accPr>
+                          <m:chr m:val="̂"/>
+                          <m:ctrlPr>
+                            <a:rPr lang="en-US" b="0" i="1" smtClean="0">
+                              <a:latin typeface="Cambria Math" panose="02040503050406030204" pitchFamily="18" charset="0"/>
+                            </a:rPr>
+                          </m:ctrlPr>
+                        </m:accPr>
+                        <m:e>
+                          <m:r>
+                            <a:rPr lang="en-US" b="0" i="1" smtClean="0">
+                              <a:latin typeface="Cambria Math" panose="02040503050406030204" pitchFamily="18" charset="0"/>
+                            </a:rPr>
+                            <m:t>𝑦</m:t>
+                          </m:r>
+                        </m:e>
+                      </m:acc>
+                    </m:oMath>
+                  </m:oMathPara>
+                </a14:m>
+                <a:endParaRPr lang="en-US" dirty="0"/>
+              </a:p>
+            </p:txBody>
+          </p:sp>
+        </mc:Choice>
+        <mc:Fallback xmlns="">
+          <p:sp>
+            <p:nvSpPr>
+              <p:cNvPr id="25" name="TextBox 24">
+                <a:extLst>
+                  <a:ext uri="{FF2B5EF4-FFF2-40B4-BE49-F238E27FC236}">
+                    <a16:creationId xmlns:a16="http://schemas.microsoft.com/office/drawing/2014/main" id="{38D910C3-2068-2E7C-A940-D80A1361845D}"/>
+                  </a:ext>
+                </a:extLst>
+              </p:cNvPr>
+              <p:cNvSpPr txBox="1">
+                <a:spLocks noRot="1" noChangeAspect="1" noMove="1" noResize="1" noEditPoints="1" noAdjustHandles="1" noChangeArrowheads="1" noChangeShapeType="1" noTextEdit="1"/>
+              </p:cNvSpPr>
+              <p:nvPr/>
+            </p:nvSpPr>
+            <p:spPr>
+              <a:xfrm>
+                <a:off x="4603592" y="2351867"/>
+                <a:ext cx="306516" cy="369332"/>
+              </a:xfrm>
+              <a:prstGeom prst="rect">
+                <a:avLst/>
+              </a:prstGeom>
+              <a:blipFill>
+                <a:blip r:embed="rId12"/>
+                <a:stretch>
+                  <a:fillRect t="-6667" r="-12000" b="-6667"/>
+                </a:stretch>
+              </a:blipFill>
+            </p:spPr>
+            <p:txBody>
+              <a:bodyPr/>
+              <a:lstStyle/>
+              <a:p>
+                <a:r>
+                  <a:rPr lang="en-US">
+                    <a:noFill/>
+                  </a:rPr>
+                  <a:t> </a:t>
+                </a:r>
+              </a:p>
+            </p:txBody>
+          </p:sp>
+        </mc:Fallback>
+      </mc:AlternateContent>
+      <p:sp>
+        <p:nvSpPr>
+          <p:cNvPr id="41" name="Rectangle 40">
+            <a:extLst>
+              <a:ext uri="{FF2B5EF4-FFF2-40B4-BE49-F238E27FC236}">
+                <a16:creationId xmlns:a16="http://schemas.microsoft.com/office/drawing/2014/main" id="{24410FA2-0662-5282-CC77-FD27C7368AC0}"/>
+              </a:ext>
+            </a:extLst>
+          </p:cNvPr>
+          <p:cNvSpPr/>
+          <p:nvPr/>
+        </p:nvSpPr>
+        <p:spPr>
+          <a:xfrm rot="16200000">
+            <a:off x="9082606" y="3303749"/>
+            <a:ext cx="1432468" cy="74729"/>
+          </a:xfrm>
+          <a:prstGeom prst="rect">
+            <a:avLst/>
+          </a:prstGeom>
+          <a:solidFill>
+            <a:schemeClr val="bg2"/>
+          </a:solidFill>
+          <a:ln w="28575">
+            <a:solidFill>
+              <a:schemeClr val="tx1"/>
+            </a:solidFill>
+          </a:ln>
+        </p:spPr>
+        <p:style>
+          <a:lnRef idx="2">
+            <a:schemeClr val="accent1">
+              <a:shade val="15000"/>
+            </a:schemeClr>
+          </a:lnRef>
+          <a:fillRef idx="1">
+            <a:schemeClr val="accent1"/>
+          </a:fillRef>
+          <a:effectRef idx="0">
+            <a:schemeClr val="accent1"/>
+          </a:effectRef>
+          <a:fontRef idx="minor">
+            <a:schemeClr val="lt1"/>
+          </a:fontRef>
+        </p:style>
+        <p:txBody>
+          <a:bodyPr rtlCol="0" anchor="ctr"/>
+          <a:lstStyle/>
+          <a:p>
+            <a:pPr algn="ctr"/>
+            <a:endParaRPr lang="en-US"/>
+          </a:p>
+        </p:txBody>
+      </p:sp>
+      <mc:AlternateContent xmlns:mc="http://schemas.openxmlformats.org/markup-compatibility/2006" xmlns:a14="http://schemas.microsoft.com/office/drawing/2010/main">
+        <mc:Choice Requires="a14">
+          <p:sp>
+            <p:nvSpPr>
+              <p:cNvPr id="46" name="TextBox 45">
+                <a:extLst>
+                  <a:ext uri="{FF2B5EF4-FFF2-40B4-BE49-F238E27FC236}">
+                    <a16:creationId xmlns:a16="http://schemas.microsoft.com/office/drawing/2014/main" id="{026C3E02-97F6-B410-623D-0314A6C41E74}"/>
+                  </a:ext>
+                </a:extLst>
+              </p:cNvPr>
+              <p:cNvSpPr txBox="1"/>
+              <p:nvPr/>
+            </p:nvSpPr>
+            <p:spPr>
+              <a:xfrm>
+                <a:off x="7969066" y="3505597"/>
+                <a:ext cx="1065440" cy="391261"/>
+              </a:xfrm>
+              <a:prstGeom prst="rect">
+                <a:avLst/>
+              </a:prstGeom>
+              <a:noFill/>
+            </p:spPr>
+            <p:txBody>
+              <a:bodyPr wrap="square" rtlCol="0">
+                <a:spAutoFit/>
+              </a:bodyPr>
+              <a:lstStyle/>
+              <a:p>
+                <a:pPr/>
+                <a14:m>
+                  <m:oMathPara xmlns:m="http://schemas.openxmlformats.org/officeDocument/2006/math">
+                    <m:oMathParaPr>
+                      <m:jc m:val="centerGroup"/>
+                    </m:oMathParaPr>
+                    <m:oMath xmlns:m="http://schemas.openxmlformats.org/officeDocument/2006/math">
+                      <m:sSub>
+                        <m:sSubPr>
+                          <m:ctrlPr>
+                            <a:rPr lang="en-US" b="0" i="1" smtClean="0">
+                              <a:latin typeface="Cambria Math" panose="02040503050406030204" pitchFamily="18" charset="0"/>
+                            </a:rPr>
+                          </m:ctrlPr>
+                        </m:sSubPr>
+                        <m:e>
+                          <m:r>
+                            <a:rPr lang="en-US" b="1" i="1" smtClean="0">
+                              <a:latin typeface="Cambria Math" panose="02040503050406030204" pitchFamily="18" charset="0"/>
+                            </a:rPr>
+                            <m:t>𝑬</m:t>
+                          </m:r>
+                        </m:e>
+                        <m:sub>
+                          <m:r>
+                            <a:rPr lang="en-US" b="0" i="1" smtClean="0">
+                              <a:latin typeface="Cambria Math" panose="02040503050406030204" pitchFamily="18" charset="0"/>
+                            </a:rPr>
+                            <m:t>𝑦</m:t>
+                          </m:r>
+                          <m:r>
+                            <a:rPr lang="en-US" b="0" i="1" smtClean="0">
+                              <a:latin typeface="Cambria Math" panose="02040503050406030204" pitchFamily="18" charset="0"/>
+                            </a:rPr>
+                            <m:t>,</m:t>
+                          </m:r>
+                          <m:r>
+                            <a:rPr lang="en-US" b="0" i="1" smtClean="0">
+                              <a:latin typeface="Cambria Math" panose="02040503050406030204" pitchFamily="18" charset="0"/>
+                            </a:rPr>
+                            <m:t>𝑠𝑟𝑐</m:t>
+                          </m:r>
+                        </m:sub>
+                      </m:sSub>
+                    </m:oMath>
+                  </m:oMathPara>
+                </a14:m>
+                <a:endParaRPr lang="en-US" b="1" dirty="0"/>
+              </a:p>
+            </p:txBody>
+          </p:sp>
+        </mc:Choice>
+        <mc:Fallback xmlns="">
+          <p:sp>
+            <p:nvSpPr>
+              <p:cNvPr id="46" name="TextBox 45">
+                <a:extLst>
+                  <a:ext uri="{FF2B5EF4-FFF2-40B4-BE49-F238E27FC236}">
+                    <a16:creationId xmlns:a16="http://schemas.microsoft.com/office/drawing/2014/main" id="{026C3E02-97F6-B410-623D-0314A6C41E74}"/>
+                  </a:ext>
+                </a:extLst>
+              </p:cNvPr>
+              <p:cNvSpPr txBox="1">
+                <a:spLocks noRot="1" noChangeAspect="1" noMove="1" noResize="1" noEditPoints="1" noAdjustHandles="1" noChangeArrowheads="1" noChangeShapeType="1" noTextEdit="1"/>
+              </p:cNvSpPr>
+              <p:nvPr/>
+            </p:nvSpPr>
+            <p:spPr>
+              <a:xfrm>
+                <a:off x="7969066" y="3505597"/>
+                <a:ext cx="1065440" cy="391261"/>
+              </a:xfrm>
+              <a:prstGeom prst="rect">
+                <a:avLst/>
+              </a:prstGeom>
+              <a:blipFill>
+                <a:blip r:embed="rId13"/>
+                <a:stretch>
+                  <a:fillRect b="-4688"/>
+                </a:stretch>
+              </a:blipFill>
+            </p:spPr>
+            <p:txBody>
+              <a:bodyPr/>
+              <a:lstStyle/>
+              <a:p>
+                <a:r>
+                  <a:rPr lang="en-US">
+                    <a:noFill/>
+                  </a:rPr>
+                  <a:t> </a:t>
+                </a:r>
+              </a:p>
+            </p:txBody>
+          </p:sp>
+        </mc:Fallback>
+      </mc:AlternateContent>
+      <p:cxnSp>
+        <p:nvCxnSpPr>
+          <p:cNvPr id="49" name="Straight Arrow Connector 48">
+            <a:extLst>
+              <a:ext uri="{FF2B5EF4-FFF2-40B4-BE49-F238E27FC236}">
+                <a16:creationId xmlns:a16="http://schemas.microsoft.com/office/drawing/2014/main" id="{D26802F9-888B-C6A7-A35A-6C41F8696245}"/>
+              </a:ext>
+            </a:extLst>
+          </p:cNvPr>
+          <p:cNvCxnSpPr>
+            <a:cxnSpLocks/>
+          </p:cNvCxnSpPr>
+          <p:nvPr/>
+        </p:nvCxnSpPr>
+        <p:spPr>
+          <a:xfrm flipH="1">
+            <a:off x="8740138" y="3354888"/>
+            <a:ext cx="750941" cy="0"/>
+          </a:xfrm>
+          <a:prstGeom prst="straightConnector1">
+            <a:avLst/>
+          </a:prstGeom>
+          <a:ln w="28575">
+            <a:solidFill>
+              <a:schemeClr val="tx1"/>
+            </a:solidFill>
+            <a:tailEnd type="triangle"/>
+          </a:ln>
+        </p:spPr>
+        <p:style>
+          <a:lnRef idx="1">
+            <a:schemeClr val="accent1"/>
+          </a:lnRef>
+          <a:fillRef idx="0">
+            <a:schemeClr val="accent1"/>
+          </a:fillRef>
+          <a:effectRef idx="0">
+            <a:schemeClr val="accent1"/>
+          </a:effectRef>
+          <a:fontRef idx="minor">
+            <a:schemeClr val="tx1"/>
+          </a:fontRef>
+        </p:style>
+      </p:cxnSp>
+      <p:cxnSp>
+        <p:nvCxnSpPr>
+          <p:cNvPr id="52" name="Straight Connector 51">
+            <a:extLst>
+              <a:ext uri="{FF2B5EF4-FFF2-40B4-BE49-F238E27FC236}">
+                <a16:creationId xmlns:a16="http://schemas.microsoft.com/office/drawing/2014/main" id="{85CD6AA6-BA1C-BEBD-C3B9-80FEC73B9C47}"/>
+              </a:ext>
+            </a:extLst>
+          </p:cNvPr>
+          <p:cNvCxnSpPr/>
+          <p:nvPr/>
+        </p:nvCxnSpPr>
+        <p:spPr>
+          <a:xfrm>
+            <a:off x="8962255" y="2976503"/>
+            <a:ext cx="0" cy="729218"/>
+          </a:xfrm>
+          <a:prstGeom prst="line">
             <a:avLst/>
           </a:prstGeom>
           <a:ln w="28575">
@@ -4777,12 +5893,207 @@
             <a:schemeClr val="tx1"/>
           </a:fontRef>
         </p:style>
-        <p:txBody>
-          <a:bodyPr rtlCol="0" anchor="ctr"/>
+      </p:cxnSp>
+      <p:cxnSp>
+        <p:nvCxnSpPr>
+          <p:cNvPr id="53" name="Straight Connector 52">
+            <a:extLst>
+              <a:ext uri="{FF2B5EF4-FFF2-40B4-BE49-F238E27FC236}">
+                <a16:creationId xmlns:a16="http://schemas.microsoft.com/office/drawing/2014/main" id="{93E08D3F-BE03-5BA4-5A8C-BF21D5C4A118}"/>
+              </a:ext>
+            </a:extLst>
+          </p:cNvPr>
+          <p:cNvCxnSpPr/>
+          <p:nvPr/>
+        </p:nvCxnSpPr>
+        <p:spPr>
+          <a:xfrm>
+            <a:off x="9092496" y="2976503"/>
+            <a:ext cx="0" cy="729218"/>
+          </a:xfrm>
+          <a:prstGeom prst="line">
+            <a:avLst/>
+          </a:prstGeom>
+          <a:ln w="28575">
+            <a:solidFill>
+              <a:schemeClr val="tx1"/>
+            </a:solidFill>
+          </a:ln>
+        </p:spPr>
+        <p:style>
+          <a:lnRef idx="1">
+            <a:schemeClr val="accent1"/>
+          </a:lnRef>
+          <a:fillRef idx="0">
+            <a:schemeClr val="accent1"/>
+          </a:fillRef>
+          <a:effectRef idx="0">
+            <a:schemeClr val="accent1"/>
+          </a:effectRef>
+          <a:fontRef idx="minor">
+            <a:schemeClr val="tx1"/>
+          </a:fontRef>
+        </p:style>
+      </p:cxnSp>
+      <p:cxnSp>
+        <p:nvCxnSpPr>
+          <p:cNvPr id="54" name="Straight Connector 53">
+            <a:extLst>
+              <a:ext uri="{FF2B5EF4-FFF2-40B4-BE49-F238E27FC236}">
+                <a16:creationId xmlns:a16="http://schemas.microsoft.com/office/drawing/2014/main" id="{DC7126B2-089E-8126-5E04-4A520C4095FE}"/>
+              </a:ext>
+            </a:extLst>
+          </p:cNvPr>
+          <p:cNvCxnSpPr/>
+          <p:nvPr/>
+        </p:nvCxnSpPr>
+        <p:spPr>
+          <a:xfrm>
+            <a:off x="9232196" y="2976503"/>
+            <a:ext cx="0" cy="729218"/>
+          </a:xfrm>
+          <a:prstGeom prst="line">
+            <a:avLst/>
+          </a:prstGeom>
+          <a:ln w="28575">
+            <a:solidFill>
+              <a:schemeClr val="tx1"/>
+            </a:solidFill>
+          </a:ln>
+        </p:spPr>
+        <p:style>
+          <a:lnRef idx="1">
+            <a:schemeClr val="accent1"/>
+          </a:lnRef>
+          <a:fillRef idx="0">
+            <a:schemeClr val="accent1"/>
+          </a:fillRef>
+          <a:effectRef idx="0">
+            <a:schemeClr val="accent1"/>
+          </a:effectRef>
+          <a:fontRef idx="minor">
+            <a:schemeClr val="tx1"/>
+          </a:fontRef>
+        </p:style>
+      </p:cxnSp>
+      <p:cxnSp>
+        <p:nvCxnSpPr>
+          <p:cNvPr id="55" name="Straight Connector 54">
+            <a:extLst>
+              <a:ext uri="{FF2B5EF4-FFF2-40B4-BE49-F238E27FC236}">
+                <a16:creationId xmlns:a16="http://schemas.microsoft.com/office/drawing/2014/main" id="{F96316A5-73A0-49E7-BAFE-283E4B3763AC}"/>
+              </a:ext>
+            </a:extLst>
+          </p:cNvPr>
+          <p:cNvCxnSpPr/>
+          <p:nvPr/>
+        </p:nvCxnSpPr>
+        <p:spPr>
+          <a:xfrm>
+            <a:off x="9371896" y="2976503"/>
+            <a:ext cx="0" cy="729218"/>
+          </a:xfrm>
+          <a:prstGeom prst="line">
+            <a:avLst/>
+          </a:prstGeom>
+          <a:ln w="28575">
+            <a:solidFill>
+              <a:schemeClr val="tx1"/>
+            </a:solidFill>
+          </a:ln>
+        </p:spPr>
+        <p:style>
+          <a:lnRef idx="1">
+            <a:schemeClr val="accent1"/>
+          </a:lnRef>
+          <a:fillRef idx="0">
+            <a:schemeClr val="accent1"/>
+          </a:fillRef>
+          <a:effectRef idx="0">
+            <a:schemeClr val="accent1"/>
+          </a:effectRef>
+          <a:fontRef idx="minor">
+            <a:schemeClr val="tx1"/>
+          </a:fontRef>
+        </p:style>
+      </p:cxnSp>
+      <p:sp>
+        <p:nvSpPr>
+          <p:cNvPr id="65" name="TextBox 64">
+            <a:extLst>
+              <a:ext uri="{FF2B5EF4-FFF2-40B4-BE49-F238E27FC236}">
+                <a16:creationId xmlns:a16="http://schemas.microsoft.com/office/drawing/2014/main" id="{9BA13992-2299-A221-6EF1-8275C972A8BE}"/>
+              </a:ext>
+            </a:extLst>
+          </p:cNvPr>
+          <p:cNvSpPr txBox="1"/>
+          <p:nvPr/>
+        </p:nvSpPr>
+        <p:spPr>
+          <a:xfrm>
+            <a:off x="1502185" y="5341007"/>
+            <a:ext cx="752518" cy="369332"/>
+          </a:xfrm>
+          <a:prstGeom prst="rect">
+            <a:avLst/>
+          </a:prstGeom>
+          <a:noFill/>
+        </p:spPr>
+        <p:txBody>
+          <a:bodyPr wrap="square" rtlCol="0">
+            <a:spAutoFit/>
+          </a:bodyPr>
           <a:lstStyle/>
           <a:p>
             <a:pPr algn="ctr"/>
-            <a:endParaRPr lang="en-US"/>
+            <a:r>
+              <a:rPr lang="en-US" dirty="0">
+                <a:latin typeface="CMU Sans Serif" panose="02000603000000000000" pitchFamily="2" charset="0"/>
+                <a:ea typeface="CMU Sans Serif" panose="02000603000000000000" pitchFamily="2" charset="0"/>
+                <a:cs typeface="CMU Sans Serif" panose="02000603000000000000" pitchFamily="2" charset="0"/>
+              </a:rPr>
+              <a:t>(a)</a:t>
+            </a:r>
+          </a:p>
+        </p:txBody>
+      </p:sp>
+      <p:sp>
+        <p:nvSpPr>
+          <p:cNvPr id="67" name="TextBox 66">
+            <a:extLst>
+              <a:ext uri="{FF2B5EF4-FFF2-40B4-BE49-F238E27FC236}">
+                <a16:creationId xmlns:a16="http://schemas.microsoft.com/office/drawing/2014/main" id="{3108D9AC-CD3A-5E0F-6CEB-2A0FD0797774}"/>
+              </a:ext>
+            </a:extLst>
+          </p:cNvPr>
+          <p:cNvSpPr txBox="1"/>
+          <p:nvPr/>
+        </p:nvSpPr>
+        <p:spPr>
+          <a:xfrm>
+            <a:off x="6959548" y="5341007"/>
+            <a:ext cx="752518" cy="369332"/>
+          </a:xfrm>
+          <a:prstGeom prst="rect">
+            <a:avLst/>
+          </a:prstGeom>
+          <a:noFill/>
+        </p:spPr>
+        <p:txBody>
+          <a:bodyPr wrap="square" rtlCol="0">
+            <a:spAutoFit/>
+          </a:bodyPr>
+          <a:lstStyle/>
+          <a:p>
+            <a:pPr algn="ctr"/>
+            <a:r>
+              <a:rPr lang="en-US" dirty="0">
+                <a:latin typeface="CMU Sans Serif" panose="02000603000000000000" pitchFamily="2" charset="0"/>
+                <a:ea typeface="CMU Sans Serif" panose="02000603000000000000" pitchFamily="2" charset="0"/>
+                <a:cs typeface="CMU Sans Serif" panose="02000603000000000000" pitchFamily="2" charset="0"/>
+              </a:rPr>
+              <a:t>(b)</a:t>
+            </a:r>
           </a:p>
         </p:txBody>
       </p:sp>

</xml_diff>